<commit_message>
tutorial titles synchonized with packages
</commit_message>
<xml_diff>
--- a/doc/Agent Programming with JADE.pptx
+++ b/doc/Agent Programming with JADE.pptx
@@ -13,19 +13,19 @@
     <p:sldId id="274" r:id="rId4"/>
     <p:sldId id="262" r:id="rId5"/>
     <p:sldId id="257" r:id="rId6"/>
-    <p:sldId id="263" r:id="rId7"/>
-    <p:sldId id="271" r:id="rId8"/>
-    <p:sldId id="259" r:id="rId9"/>
-    <p:sldId id="264" r:id="rId10"/>
-    <p:sldId id="270" r:id="rId11"/>
-    <p:sldId id="265" r:id="rId12"/>
-    <p:sldId id="272" r:id="rId13"/>
-    <p:sldId id="266" r:id="rId14"/>
-    <p:sldId id="273" r:id="rId15"/>
-    <p:sldId id="268" r:id="rId16"/>
-    <p:sldId id="275" r:id="rId17"/>
-    <p:sldId id="261" r:id="rId18"/>
-    <p:sldId id="258" r:id="rId19"/>
+    <p:sldId id="261" r:id="rId7"/>
+    <p:sldId id="258" r:id="rId8"/>
+    <p:sldId id="263" r:id="rId9"/>
+    <p:sldId id="271" r:id="rId10"/>
+    <p:sldId id="259" r:id="rId11"/>
+    <p:sldId id="264" r:id="rId12"/>
+    <p:sldId id="270" r:id="rId13"/>
+    <p:sldId id="265" r:id="rId14"/>
+    <p:sldId id="272" r:id="rId15"/>
+    <p:sldId id="266" r:id="rId16"/>
+    <p:sldId id="273" r:id="rId17"/>
+    <p:sldId id="268" r:id="rId18"/>
+    <p:sldId id="275" r:id="rId19"/>
     <p:sldId id="269" r:id="rId20"/>
   </p:sldIdLst>
   <p:sldSz cx="12192000" cy="6858000"/>
@@ -215,7 +215,7 @@
           <a:p>
             <a:fld id="{735217E9-14BA-49DA-B20D-AB9DC43CD78F}" type="datetimeFigureOut">
               <a:rPr lang="ru-RU" smtClean="0"/>
-              <a:t>18.07.2017</a:t>
+              <a:t>11.05.2018</a:t>
             </a:fld>
             <a:endParaRPr lang="ru-RU"/>
           </a:p>
@@ -614,7 +614,7 @@
           <a:p>
             <a:fld id="{9B826932-81A0-40F2-B539-3352B158408A}" type="datetime1">
               <a:rPr lang="ru-RU" smtClean="0"/>
-              <a:t>18.07.2017</a:t>
+              <a:t>11.05.2018</a:t>
             </a:fld>
             <a:endParaRPr lang="ru-RU"/>
           </a:p>
@@ -671,7 +671,7 @@
         <p:spPr>
           <a:xfrm>
             <a:off x="1524000" y="5349875"/>
-            <a:ext cx="7567713" cy="646331"/>
+            <a:ext cx="7754752" cy="646331"/>
           </a:xfrm>
           <a:prstGeom prst="rect">
             <a:avLst/>
@@ -703,7 +703,27 @@
             </a:pPr>
             <a:r>
               <a:rPr lang="en-US" b="1" dirty="0" smtClean="0"/>
-              <a:t>3rd International Summer School on Intelligent Agents in Automation</a:t>
+              <a:t>4</a:t>
+            </a:r>
+            <a:r>
+              <a:rPr lang="en-US" b="1" baseline="30000" dirty="0" smtClean="0"/>
+              <a:t>th</a:t>
+            </a:r>
+            <a:r>
+              <a:rPr lang="en-US" b="1" dirty="0" smtClean="0"/>
+              <a:t> International Summer </a:t>
+            </a:r>
+            <a:r>
+              <a:rPr lang="en-US" b="1" dirty="0" smtClean="0"/>
+              <a:t>School on </a:t>
+            </a:r>
+            <a:r>
+              <a:rPr lang="en-US" b="1" dirty="0" smtClean="0"/>
+              <a:t>Industrial</a:t>
+            </a:r>
+            <a:r>
+              <a:rPr lang="en-US" b="1" baseline="0" dirty="0" smtClean="0"/>
+              <a:t> Agents &amp; Cyber-Physical Systems</a:t>
             </a:r>
           </a:p>
           <a:p>
@@ -725,9 +745,26 @@
               <a:defRPr/>
             </a:pPr>
             <a:r>
-              <a:rPr lang="en-US" b="1" dirty="0" smtClean="0"/>
-              <a:t>20th - 28th of July 2017, University of Applied Sciences Emden-Leer, Germany</a:t>
-            </a:r>
+              <a:rPr lang="en-US" b="1" baseline="0" dirty="0" smtClean="0"/>
+              <a:t>11</a:t>
+            </a:r>
+            <a:r>
+              <a:rPr lang="en-US" b="1" baseline="30000" dirty="0" smtClean="0"/>
+              <a:t>th</a:t>
+            </a:r>
+            <a:r>
+              <a:rPr lang="en-US" b="1" baseline="0" dirty="0" smtClean="0"/>
+              <a:t>-18</a:t>
+            </a:r>
+            <a:r>
+              <a:rPr lang="en-US" b="1" baseline="30000" dirty="0" smtClean="0"/>
+              <a:t>th</a:t>
+            </a:r>
+            <a:r>
+              <a:rPr lang="en-US" b="1" baseline="0" dirty="0" smtClean="0"/>
+              <a:t> of May 2018, ITMO University, Russia</a:t>
+            </a:r>
+            <a:endParaRPr lang="en-US" b="1" dirty="0" smtClean="0"/>
           </a:p>
         </p:txBody>
       </p:sp>
@@ -853,7 +890,7 @@
           <a:p>
             <a:fld id="{67C9D899-A30F-477B-A245-83936AC5ABC1}" type="datetime1">
               <a:rPr lang="ru-RU" smtClean="0"/>
-              <a:t>18.07.2017</a:t>
+              <a:t>11.05.2018</a:t>
             </a:fld>
             <a:endParaRPr lang="ru-RU"/>
           </a:p>
@@ -1033,7 +1070,7 @@
           <a:p>
             <a:fld id="{5C4E3545-04D1-43D7-8384-FBF35C512710}" type="datetime1">
               <a:rPr lang="ru-RU" smtClean="0"/>
-              <a:t>18.07.2017</a:t>
+              <a:t>11.05.2018</a:t>
             </a:fld>
             <a:endParaRPr lang="ru-RU"/>
           </a:p>
@@ -1203,7 +1240,7 @@
           <a:p>
             <a:fld id="{2D604331-03A8-487B-AC54-9BF53AE61FE7}" type="datetime1">
               <a:rPr lang="ru-RU" smtClean="0"/>
-              <a:t>18.07.2017</a:t>
+              <a:t>11.05.2018</a:t>
             </a:fld>
             <a:endParaRPr lang="ru-RU"/>
           </a:p>
@@ -1449,7 +1486,7 @@
           <a:p>
             <a:fld id="{D1E51CB1-299A-427B-8B45-1500EEA90DB8}" type="datetime1">
               <a:rPr lang="ru-RU" smtClean="0"/>
-              <a:t>18.07.2017</a:t>
+              <a:t>11.05.2018</a:t>
             </a:fld>
             <a:endParaRPr lang="ru-RU"/>
           </a:p>
@@ -1681,7 +1718,7 @@
           <a:p>
             <a:fld id="{4F205406-0BBC-4037-A0A3-85130D452242}" type="datetime1">
               <a:rPr lang="ru-RU" smtClean="0"/>
-              <a:t>18.07.2017</a:t>
+              <a:t>11.05.2018</a:t>
             </a:fld>
             <a:endParaRPr lang="ru-RU"/>
           </a:p>
@@ -2048,7 +2085,7 @@
           <a:p>
             <a:fld id="{C3AD7237-6278-4181-8E38-49D9ED9E4E3C}" type="datetime1">
               <a:rPr lang="ru-RU" smtClean="0"/>
-              <a:t>18.07.2017</a:t>
+              <a:t>11.05.2018</a:t>
             </a:fld>
             <a:endParaRPr lang="ru-RU"/>
           </a:p>
@@ -2166,7 +2203,7 @@
           <a:p>
             <a:fld id="{B48C8529-DCC5-4F41-823E-38D9BFE47761}" type="datetime1">
               <a:rPr lang="ru-RU" smtClean="0"/>
-              <a:t>18.07.2017</a:t>
+              <a:t>11.05.2018</a:t>
             </a:fld>
             <a:endParaRPr lang="ru-RU"/>
           </a:p>
@@ -2261,7 +2298,7 @@
           <a:p>
             <a:fld id="{4DDA8E1D-01F9-423C-80F3-BA1EBA919571}" type="datetime1">
               <a:rPr lang="ru-RU" smtClean="0"/>
-              <a:t>18.07.2017</a:t>
+              <a:t>11.05.2018</a:t>
             </a:fld>
             <a:endParaRPr lang="ru-RU"/>
           </a:p>
@@ -2538,7 +2575,7 @@
           <a:p>
             <a:fld id="{9786AD56-8CB6-4640-BF80-ACF59CD09515}" type="datetime1">
               <a:rPr lang="ru-RU" smtClean="0"/>
-              <a:t>18.07.2017</a:t>
+              <a:t>11.05.2018</a:t>
             </a:fld>
             <a:endParaRPr lang="ru-RU"/>
           </a:p>
@@ -2791,7 +2828,7 @@
           <a:p>
             <a:fld id="{E33C92D0-4B3F-4DFD-827F-1C5F763CE2C4}" type="datetime1">
               <a:rPr lang="ru-RU" smtClean="0"/>
-              <a:t>18.07.2017</a:t>
+              <a:t>11.05.2018</a:t>
             </a:fld>
             <a:endParaRPr lang="ru-RU"/>
           </a:p>
@@ -3004,7 +3041,7 @@
           <a:p>
             <a:fld id="{CC2A71B7-10FB-4AB6-9D2E-C287E4578D7A}" type="datetime1">
               <a:rPr lang="ru-RU" smtClean="0"/>
-              <a:t>18.07.2017</a:t>
+              <a:t>11.05.2018</a:t>
             </a:fld>
             <a:endParaRPr lang="ru-RU"/>
           </a:p>
@@ -3526,6 +3563,203 @@
       </p:grpSpPr>
       <p:sp>
         <p:nvSpPr>
+          <p:cNvPr id="2" name="Заголовок 1"/>
+          <p:cNvSpPr>
+            <a:spLocks noGrp="1"/>
+          </p:cNvSpPr>
+          <p:nvPr>
+            <p:ph type="title"/>
+          </p:nvPr>
+        </p:nvSpPr>
+        <p:spPr/>
+        <p:txBody>
+          <a:bodyPr/>
+          <a:lstStyle/>
+          <a:p>
+            <a:r>
+              <a:rPr lang="en-US" dirty="0" smtClean="0"/>
+              <a:t>JADE Behaviors</a:t>
+            </a:r>
+            <a:endParaRPr lang="ru-RU" dirty="0"/>
+          </a:p>
+        </p:txBody>
+      </p:sp>
+      <p:pic>
+        <p:nvPicPr>
+          <p:cNvPr id="5" name="Объект 4"/>
+          <p:cNvPicPr>
+            <a:picLocks noGrp="1" noChangeAspect="1"/>
+          </p:cNvPicPr>
+          <p:nvPr>
+            <p:ph idx="1"/>
+          </p:nvPr>
+        </p:nvPicPr>
+        <p:blipFill>
+          <a:blip r:embed="rId2">
+            <a:extLst>
+              <a:ext uri="{28A0092B-C50C-407E-A947-70E740481C1C}">
+                <a14:useLocalDpi xmlns:a14="http://schemas.microsoft.com/office/drawing/2010/main" val="0"/>
+              </a:ext>
+            </a:extLst>
+          </a:blip>
+          <a:stretch>
+            <a:fillRect/>
+          </a:stretch>
+        </p:blipFill>
+        <p:spPr>
+          <a:xfrm>
+            <a:off x="818604" y="1288159"/>
+            <a:ext cx="5852160" cy="5615411"/>
+          </a:xfrm>
+        </p:spPr>
+      </p:pic>
+      <p:sp>
+        <p:nvSpPr>
+          <p:cNvPr id="4" name="Номер слайда 3"/>
+          <p:cNvSpPr>
+            <a:spLocks noGrp="1"/>
+          </p:cNvSpPr>
+          <p:nvPr>
+            <p:ph type="sldNum" sz="quarter" idx="12"/>
+          </p:nvPr>
+        </p:nvSpPr>
+        <p:spPr/>
+        <p:txBody>
+          <a:bodyPr/>
+          <a:lstStyle/>
+          <a:p>
+            <a:fld id="{4AD73BAB-CB55-4437-A9BC-DEADF4FBD81E}" type="slidenum">
+              <a:rPr lang="ru-RU" smtClean="0"/>
+              <a:t>10</a:t>
+            </a:fld>
+            <a:endParaRPr lang="ru-RU"/>
+          </a:p>
+        </p:txBody>
+      </p:sp>
+      <p:sp>
+        <p:nvSpPr>
+          <p:cNvPr id="6" name="TextBox 5"/>
+          <p:cNvSpPr txBox="1"/>
+          <p:nvPr/>
+        </p:nvSpPr>
+        <p:spPr>
+          <a:xfrm>
+            <a:off x="7104888" y="1690688"/>
+            <a:ext cx="4727448" cy="2585323"/>
+          </a:xfrm>
+          <a:prstGeom prst="rect">
+            <a:avLst/>
+          </a:prstGeom>
+          <a:noFill/>
+        </p:spPr>
+        <p:txBody>
+          <a:bodyPr wrap="square" rtlCol="0">
+            <a:spAutoFit/>
+          </a:bodyPr>
+          <a:lstStyle/>
+          <a:p>
+            <a:r>
+              <a:rPr lang="en-US" dirty="0" smtClean="0"/>
+              <a:t>Behaviors are used to implement agent activities</a:t>
+            </a:r>
+          </a:p>
+          <a:p>
+            <a:endParaRPr lang="en-US" dirty="0" smtClean="0"/>
+          </a:p>
+          <a:p>
+            <a:r>
+              <a:rPr lang="en-US" dirty="0" smtClean="0"/>
+              <a:t>Each class extending Behavior must implement the action() method, that actually defines the operations to be performed when the behavior is in execution and the done() method, that specifies whether or not a behavior has completed and have to be removed from the pool of </a:t>
+            </a:r>
+            <a:r>
+              <a:rPr lang="en-US" dirty="0" err="1" smtClean="0"/>
+              <a:t>behavious</a:t>
+            </a:r>
+            <a:r>
+              <a:rPr lang="en-US" dirty="0" smtClean="0"/>
+              <a:t> an agent is carrying out.</a:t>
+            </a:r>
+            <a:endParaRPr lang="en-US" dirty="0"/>
+          </a:p>
+        </p:txBody>
+      </p:sp>
+      <p:sp>
+        <p:nvSpPr>
+          <p:cNvPr id="7" name="TextBox 6"/>
+          <p:cNvSpPr txBox="1"/>
+          <p:nvPr/>
+        </p:nvSpPr>
+        <p:spPr>
+          <a:xfrm>
+            <a:off x="5397659" y="6642556"/>
+            <a:ext cx="1273105" cy="215444"/>
+          </a:xfrm>
+          <a:prstGeom prst="rect">
+            <a:avLst/>
+          </a:prstGeom>
+          <a:noFill/>
+        </p:spPr>
+        <p:txBody>
+          <a:bodyPr wrap="none" rtlCol="0">
+            <a:spAutoFit/>
+          </a:bodyPr>
+          <a:lstStyle/>
+          <a:p>
+            <a:r>
+              <a:rPr lang="en-US" sz="800" dirty="0" smtClean="0"/>
+              <a:t>JADE Programmer’s </a:t>
+            </a:r>
+            <a:r>
+              <a:rPr lang="en-US" sz="800" dirty="0"/>
+              <a:t>G</a:t>
+            </a:r>
+            <a:r>
+              <a:rPr lang="en-US" sz="800" dirty="0" smtClean="0"/>
+              <a:t>uide</a:t>
+            </a:r>
+            <a:endParaRPr lang="ru-RU" sz="800" dirty="0"/>
+          </a:p>
+        </p:txBody>
+      </p:sp>
+    </p:spTree>
+    <p:extLst>
+      <p:ext uri="{BB962C8B-B14F-4D97-AF65-F5344CB8AC3E}">
+        <p14:creationId xmlns:p14="http://schemas.microsoft.com/office/powerpoint/2010/main" val="1779358783"/>
+      </p:ext>
+    </p:extLst>
+  </p:cSld>
+  <p:clrMapOvr>
+    <a:masterClrMapping/>
+  </p:clrMapOvr>
+  <p:timing>
+    <p:tnLst>
+      <p:par>
+        <p:cTn id="1" dur="indefinite" restart="never" nodeType="tmRoot"/>
+      </p:par>
+    </p:tnLst>
+  </p:timing>
+</p:sld>
+</file>
+
+<file path=ppt/slides/slide11.xml><?xml version="1.0" encoding="utf-8"?>
+<p:sld xmlns:a="http://schemas.openxmlformats.org/drawingml/2006/main" xmlns:r="http://schemas.openxmlformats.org/officeDocument/2006/relationships" xmlns:p="http://schemas.openxmlformats.org/presentationml/2006/main">
+  <p:cSld>
+    <p:spTree>
+      <p:nvGrpSpPr>
+        <p:cNvPr id="1" name=""/>
+        <p:cNvGrpSpPr/>
+        <p:nvPr/>
+      </p:nvGrpSpPr>
+      <p:grpSpPr>
+        <a:xfrm>
+          <a:off x="0" y="0"/>
+          <a:ext cx="0" cy="0"/>
+          <a:chOff x="0" y="0"/>
+          <a:chExt cx="0" cy="0"/>
+        </a:xfrm>
+      </p:grpSpPr>
+      <p:sp>
+        <p:nvSpPr>
           <p:cNvPr id="5" name="Заголовок 4"/>
           <p:cNvSpPr>
             <a:spLocks noGrp="1"/>
@@ -3541,8 +3775,117 @@
           <a:p>
             <a:r>
               <a:rPr lang="en-US" dirty="0" smtClean="0"/>
+              <a:t>Tutorial </a:t>
+            </a:r>
+            <a:r>
+              <a:rPr lang="en-US" dirty="0" smtClean="0"/>
+              <a:t>4</a:t>
+            </a:r>
+            <a:endParaRPr lang="ru-RU" dirty="0"/>
+          </a:p>
+        </p:txBody>
+      </p:sp>
+      <p:sp>
+        <p:nvSpPr>
+          <p:cNvPr id="6" name="Текст 5"/>
+          <p:cNvSpPr>
+            <a:spLocks noGrp="1"/>
+          </p:cNvSpPr>
+          <p:nvPr>
+            <p:ph type="body" idx="1"/>
+          </p:nvPr>
+        </p:nvSpPr>
+        <p:spPr/>
+        <p:txBody>
+          <a:bodyPr/>
+          <a:lstStyle/>
+          <a:p>
+            <a:r>
+              <a:rPr lang="en-US" dirty="0" smtClean="0"/>
               <a:t>Receiving and sending Messages</a:t>
             </a:r>
+          </a:p>
+        </p:txBody>
+      </p:sp>
+      <p:sp>
+        <p:nvSpPr>
+          <p:cNvPr id="4" name="Номер слайда 3"/>
+          <p:cNvSpPr>
+            <a:spLocks noGrp="1"/>
+          </p:cNvSpPr>
+          <p:nvPr>
+            <p:ph type="sldNum" sz="quarter" idx="12"/>
+          </p:nvPr>
+        </p:nvSpPr>
+        <p:spPr/>
+        <p:txBody>
+          <a:bodyPr/>
+          <a:lstStyle/>
+          <a:p>
+            <a:fld id="{4AD73BAB-CB55-4437-A9BC-DEADF4FBD81E}" type="slidenum">
+              <a:rPr lang="ru-RU" smtClean="0"/>
+              <a:t>11</a:t>
+            </a:fld>
+            <a:endParaRPr lang="ru-RU"/>
+          </a:p>
+        </p:txBody>
+      </p:sp>
+    </p:spTree>
+    <p:extLst>
+      <p:ext uri="{BB962C8B-B14F-4D97-AF65-F5344CB8AC3E}">
+        <p14:creationId xmlns:p14="http://schemas.microsoft.com/office/powerpoint/2010/main" val="1868951449"/>
+      </p:ext>
+    </p:extLst>
+  </p:cSld>
+  <p:clrMapOvr>
+    <a:masterClrMapping/>
+  </p:clrMapOvr>
+  <p:timing>
+    <p:tnLst>
+      <p:par>
+        <p:cTn id="1" dur="indefinite" restart="never" nodeType="tmRoot"/>
+      </p:par>
+    </p:tnLst>
+  </p:timing>
+</p:sld>
+</file>
+
+<file path=ppt/slides/slide12.xml><?xml version="1.0" encoding="utf-8"?>
+<p:sld xmlns:a="http://schemas.openxmlformats.org/drawingml/2006/main" xmlns:r="http://schemas.openxmlformats.org/officeDocument/2006/relationships" xmlns:p="http://schemas.openxmlformats.org/presentationml/2006/main">
+  <p:cSld>
+    <p:spTree>
+      <p:nvGrpSpPr>
+        <p:cNvPr id="1" name=""/>
+        <p:cNvGrpSpPr/>
+        <p:nvPr/>
+      </p:nvGrpSpPr>
+      <p:grpSpPr>
+        <a:xfrm>
+          <a:off x="0" y="0"/>
+          <a:ext cx="0" cy="0"/>
+          <a:chOff x="0" y="0"/>
+          <a:chExt cx="0" cy="0"/>
+        </a:xfrm>
+      </p:grpSpPr>
+      <p:sp>
+        <p:nvSpPr>
+          <p:cNvPr id="5" name="Заголовок 4"/>
+          <p:cNvSpPr>
+            <a:spLocks noGrp="1"/>
+          </p:cNvSpPr>
+          <p:nvPr>
+            <p:ph type="title"/>
+          </p:nvPr>
+        </p:nvSpPr>
+        <p:spPr/>
+        <p:txBody>
+          <a:bodyPr/>
+          <a:lstStyle/>
+          <a:p>
+            <a:r>
+              <a:rPr lang="en-US" dirty="0" smtClean="0"/>
+              <a:t>Receiving and sending Messages</a:t>
+            </a:r>
             <a:endParaRPr lang="ru-RU" dirty="0"/>
           </a:p>
         </p:txBody>
@@ -3564,7 +3907,7 @@
           <a:p>
             <a:fld id="{4AD73BAB-CB55-4437-A9BC-DEADF4FBD81E}" type="slidenum">
               <a:rPr lang="ru-RU" smtClean="0"/>
-              <a:t>10</a:t>
+              <a:t>12</a:t>
             </a:fld>
             <a:endParaRPr lang="ru-RU"/>
           </a:p>
@@ -3663,7 +4006,7 @@
 </p:sld>
 </file>
 
-<file path=ppt/slides/slide11.xml><?xml version="1.0" encoding="utf-8"?>
+<file path=ppt/slides/slide13.xml><?xml version="1.0" encoding="utf-8"?>
 <p:sld xmlns:a="http://schemas.openxmlformats.org/drawingml/2006/main" xmlns:r="http://schemas.openxmlformats.org/officeDocument/2006/relationships" xmlns:p="http://schemas.openxmlformats.org/presentationml/2006/main">
   <p:cSld>
     <p:spTree>
@@ -3697,7 +4040,11 @@
           <a:p>
             <a:r>
               <a:rPr lang="en-US" dirty="0" smtClean="0"/>
-              <a:t>Tutorial 3</a:t>
+              <a:t>Tutorial </a:t>
+            </a:r>
+            <a:r>
+              <a:rPr lang="en-US" dirty="0" smtClean="0"/>
+              <a:t>5</a:t>
             </a:r>
             <a:endParaRPr lang="ru-RU" dirty="0"/>
           </a:p>
@@ -3742,7 +4089,7 @@
           <a:p>
             <a:fld id="{4AD73BAB-CB55-4437-A9BC-DEADF4FBD81E}" type="slidenum">
               <a:rPr lang="ru-RU" smtClean="0"/>
-              <a:t>11</a:t>
+              <a:t>13</a:t>
             </a:fld>
             <a:endParaRPr lang="ru-RU"/>
           </a:p>
@@ -3768,7 +4115,7 @@
 </p:sld>
 </file>
 
-<file path=ppt/slides/slide12.xml><?xml version="1.0" encoding="utf-8"?>
+<file path=ppt/slides/slide14.xml><?xml version="1.0" encoding="utf-8"?>
 <p:sld xmlns:a="http://schemas.openxmlformats.org/drawingml/2006/main" xmlns:r="http://schemas.openxmlformats.org/officeDocument/2006/relationships" xmlns:p="http://schemas.openxmlformats.org/presentationml/2006/main">
   <p:cSld>
     <p:spTree>
@@ -3825,7 +4172,7 @@
           <a:p>
             <a:fld id="{4AD73BAB-CB55-4437-A9BC-DEADF4FBD81E}" type="slidenum">
               <a:rPr lang="ru-RU" smtClean="0"/>
-              <a:t>12</a:t>
+              <a:t>14</a:t>
             </a:fld>
             <a:endParaRPr lang="ru-RU"/>
           </a:p>
@@ -3933,277 +4280,6 @@
 </p:sld>
 </file>
 
-<file path=ppt/slides/slide13.xml><?xml version="1.0" encoding="utf-8"?>
-<p:sld xmlns:a="http://schemas.openxmlformats.org/drawingml/2006/main" xmlns:r="http://schemas.openxmlformats.org/officeDocument/2006/relationships" xmlns:p="http://schemas.openxmlformats.org/presentationml/2006/main">
-  <p:cSld>
-    <p:spTree>
-      <p:nvGrpSpPr>
-        <p:cNvPr id="1" name=""/>
-        <p:cNvGrpSpPr/>
-        <p:nvPr/>
-      </p:nvGrpSpPr>
-      <p:grpSpPr>
-        <a:xfrm>
-          <a:off x="0" y="0"/>
-          <a:ext cx="0" cy="0"/>
-          <a:chOff x="0" y="0"/>
-          <a:chExt cx="0" cy="0"/>
-        </a:xfrm>
-      </p:grpSpPr>
-      <p:sp>
-        <p:nvSpPr>
-          <p:cNvPr id="2" name="Заголовок 1"/>
-          <p:cNvSpPr>
-            <a:spLocks noGrp="1"/>
-          </p:cNvSpPr>
-          <p:nvPr>
-            <p:ph type="title"/>
-          </p:nvPr>
-        </p:nvSpPr>
-        <p:spPr/>
-        <p:txBody>
-          <a:bodyPr/>
-          <a:lstStyle/>
-          <a:p>
-            <a:r>
-              <a:rPr lang="en-US" dirty="0" smtClean="0"/>
-              <a:t>Tutorial 4</a:t>
-            </a:r>
-            <a:endParaRPr lang="ru-RU" dirty="0"/>
-          </a:p>
-        </p:txBody>
-      </p:sp>
-      <p:sp>
-        <p:nvSpPr>
-          <p:cNvPr id="3" name="Текст 2"/>
-          <p:cNvSpPr>
-            <a:spLocks noGrp="1"/>
-          </p:cNvSpPr>
-          <p:nvPr>
-            <p:ph type="body" idx="1"/>
-          </p:nvPr>
-        </p:nvSpPr>
-        <p:spPr/>
-        <p:txBody>
-          <a:bodyPr/>
-          <a:lstStyle/>
-          <a:p>
-            <a:r>
-              <a:rPr lang="en-US" dirty="0" smtClean="0"/>
-              <a:t>Interaction Protocol</a:t>
-            </a:r>
-            <a:endParaRPr lang="ru-RU" dirty="0"/>
-          </a:p>
-        </p:txBody>
-      </p:sp>
-      <p:sp>
-        <p:nvSpPr>
-          <p:cNvPr id="4" name="Номер слайда 3"/>
-          <p:cNvSpPr>
-            <a:spLocks noGrp="1"/>
-          </p:cNvSpPr>
-          <p:nvPr>
-            <p:ph type="sldNum" sz="quarter" idx="12"/>
-          </p:nvPr>
-        </p:nvSpPr>
-        <p:spPr/>
-        <p:txBody>
-          <a:bodyPr/>
-          <a:lstStyle/>
-          <a:p>
-            <a:fld id="{4AD73BAB-CB55-4437-A9BC-DEADF4FBD81E}" type="slidenum">
-              <a:rPr lang="ru-RU" smtClean="0"/>
-              <a:t>13</a:t>
-            </a:fld>
-            <a:endParaRPr lang="ru-RU"/>
-          </a:p>
-        </p:txBody>
-      </p:sp>
-    </p:spTree>
-    <p:extLst>
-      <p:ext uri="{BB962C8B-B14F-4D97-AF65-F5344CB8AC3E}">
-        <p14:creationId xmlns:p14="http://schemas.microsoft.com/office/powerpoint/2010/main" val="2022414725"/>
-      </p:ext>
-    </p:extLst>
-  </p:cSld>
-  <p:clrMapOvr>
-    <a:masterClrMapping/>
-  </p:clrMapOvr>
-  <p:timing>
-    <p:tnLst>
-      <p:par>
-        <p:cTn id="1" dur="indefinite" restart="never" nodeType="tmRoot"/>
-      </p:par>
-    </p:tnLst>
-  </p:timing>
-</p:sld>
-</file>
-
-<file path=ppt/slides/slide14.xml><?xml version="1.0" encoding="utf-8"?>
-<p:sld xmlns:a="http://schemas.openxmlformats.org/drawingml/2006/main" xmlns:r="http://schemas.openxmlformats.org/officeDocument/2006/relationships" xmlns:p="http://schemas.openxmlformats.org/presentationml/2006/main">
-  <p:cSld>
-    <p:spTree>
-      <p:nvGrpSpPr>
-        <p:cNvPr id="1" name=""/>
-        <p:cNvGrpSpPr/>
-        <p:nvPr/>
-      </p:nvGrpSpPr>
-      <p:grpSpPr>
-        <a:xfrm>
-          <a:off x="0" y="0"/>
-          <a:ext cx="0" cy="0"/>
-          <a:chOff x="0" y="0"/>
-          <a:chExt cx="0" cy="0"/>
-        </a:xfrm>
-      </p:grpSpPr>
-      <p:sp>
-        <p:nvSpPr>
-          <p:cNvPr id="5" name="Заголовок 4"/>
-          <p:cNvSpPr>
-            <a:spLocks noGrp="1"/>
-          </p:cNvSpPr>
-          <p:nvPr>
-            <p:ph type="title"/>
-          </p:nvPr>
-        </p:nvSpPr>
-        <p:spPr/>
-        <p:txBody>
-          <a:bodyPr/>
-          <a:lstStyle/>
-          <a:p>
-            <a:r>
-              <a:rPr lang="en-US" dirty="0" smtClean="0"/>
-              <a:t>Interaction Protocol</a:t>
-            </a:r>
-            <a:endParaRPr lang="ru-RU" dirty="0"/>
-          </a:p>
-        </p:txBody>
-      </p:sp>
-      <p:pic>
-        <p:nvPicPr>
-          <p:cNvPr id="7" name="Объект 6"/>
-          <p:cNvPicPr>
-            <a:picLocks noGrp="1" noChangeAspect="1"/>
-          </p:cNvPicPr>
-          <p:nvPr>
-            <p:ph idx="1"/>
-          </p:nvPr>
-        </p:nvPicPr>
-        <p:blipFill>
-          <a:blip r:embed="rId2">
-            <a:extLst>
-              <a:ext uri="{28A0092B-C50C-407E-A947-70E740481C1C}">
-                <a14:useLocalDpi xmlns:a14="http://schemas.microsoft.com/office/drawing/2010/main" val="0"/>
-              </a:ext>
-            </a:extLst>
-          </a:blip>
-          <a:stretch>
-            <a:fillRect/>
-          </a:stretch>
-        </p:blipFill>
-        <p:spPr>
-          <a:xfrm>
-            <a:off x="838200" y="1404453"/>
-            <a:ext cx="3619500" cy="4951897"/>
-          </a:xfrm>
-        </p:spPr>
-      </p:pic>
-      <p:sp>
-        <p:nvSpPr>
-          <p:cNvPr id="4" name="Номер слайда 3"/>
-          <p:cNvSpPr>
-            <a:spLocks noGrp="1"/>
-          </p:cNvSpPr>
-          <p:nvPr>
-            <p:ph type="sldNum" sz="quarter" idx="12"/>
-          </p:nvPr>
-        </p:nvSpPr>
-        <p:spPr/>
-        <p:txBody>
-          <a:bodyPr/>
-          <a:lstStyle/>
-          <a:p>
-            <a:fld id="{4AD73BAB-CB55-4437-A9BC-DEADF4FBD81E}" type="slidenum">
-              <a:rPr lang="ru-RU" smtClean="0"/>
-              <a:t>14</a:t>
-            </a:fld>
-            <a:endParaRPr lang="ru-RU"/>
-          </a:p>
-        </p:txBody>
-      </p:sp>
-      <p:sp>
-        <p:nvSpPr>
-          <p:cNvPr id="8" name="TextBox 7"/>
-          <p:cNvSpPr txBox="1"/>
-          <p:nvPr/>
-        </p:nvSpPr>
-        <p:spPr>
-          <a:xfrm>
-            <a:off x="5753100" y="1933575"/>
-            <a:ext cx="5743575" cy="646331"/>
-          </a:xfrm>
-          <a:prstGeom prst="rect">
-            <a:avLst/>
-          </a:prstGeom>
-          <a:noFill/>
-        </p:spPr>
-        <p:txBody>
-          <a:bodyPr wrap="square" rtlCol="0">
-            <a:spAutoFit/>
-          </a:bodyPr>
-          <a:lstStyle/>
-          <a:p>
-            <a:r>
-              <a:rPr lang="en-US" dirty="0" smtClean="0"/>
-              <a:t>Replace manual communicative act states handling with FIPA-Contract-Net-Protocol</a:t>
-            </a:r>
-            <a:endParaRPr lang="ru-RU" dirty="0"/>
-          </a:p>
-        </p:txBody>
-      </p:sp>
-      <p:sp>
-        <p:nvSpPr>
-          <p:cNvPr id="10" name="TextBox 9"/>
-          <p:cNvSpPr txBox="1"/>
-          <p:nvPr/>
-        </p:nvSpPr>
-        <p:spPr>
-          <a:xfrm>
-            <a:off x="5753100" y="2905125"/>
-            <a:ext cx="4804007" cy="369332"/>
-          </a:xfrm>
-          <a:prstGeom prst="rect">
-            <a:avLst/>
-          </a:prstGeom>
-          <a:noFill/>
-        </p:spPr>
-        <p:txBody>
-          <a:bodyPr wrap="none" rtlCol="0">
-            <a:spAutoFit/>
-          </a:bodyPr>
-          <a:lstStyle/>
-          <a:p>
-            <a:r>
-              <a:rPr lang="en-US" dirty="0"/>
-              <a:t>http://www.fipa.org/specs/fipa00029/index.html</a:t>
-            </a:r>
-            <a:endParaRPr lang="ru-RU" dirty="0"/>
-          </a:p>
-        </p:txBody>
-      </p:sp>
-    </p:spTree>
-    <p:extLst>
-      <p:ext uri="{BB962C8B-B14F-4D97-AF65-F5344CB8AC3E}">
-        <p14:creationId xmlns:p14="http://schemas.microsoft.com/office/powerpoint/2010/main" val="3214541992"/>
-      </p:ext>
-    </p:extLst>
-  </p:cSld>
-  <p:clrMapOvr>
-    <a:masterClrMapping/>
-  </p:clrMapOvr>
-</p:sld>
-</file>
-
 <file path=ppt/slides/slide15.xml><?xml version="1.0" encoding="utf-8"?>
 <p:sld xmlns:a="http://schemas.openxmlformats.org/drawingml/2006/main" xmlns:r="http://schemas.openxmlformats.org/officeDocument/2006/relationships" xmlns:p="http://schemas.openxmlformats.org/presentationml/2006/main">
   <p:cSld>
@@ -4238,7 +4314,11 @@
           <a:p>
             <a:r>
               <a:rPr lang="en-US" dirty="0" smtClean="0"/>
-              <a:t>Tutorial 5</a:t>
+              <a:t>Tutorial </a:t>
+            </a:r>
+            <a:r>
+              <a:rPr lang="en-US" dirty="0" smtClean="0"/>
+              <a:t>6</a:t>
             </a:r>
             <a:endParaRPr lang="ru-RU" dirty="0"/>
           </a:p>
@@ -4261,7 +4341,7 @@
           <a:p>
             <a:r>
               <a:rPr lang="en-US" dirty="0" smtClean="0"/>
-              <a:t>Ontology</a:t>
+              <a:t>Interaction Protocol</a:t>
             </a:r>
             <a:endParaRPr lang="ru-RU" dirty="0"/>
           </a:p>
@@ -4293,7 +4373,7 @@
     </p:spTree>
     <p:extLst>
       <p:ext uri="{BB962C8B-B14F-4D97-AF65-F5344CB8AC3E}">
-        <p14:creationId xmlns:p14="http://schemas.microsoft.com/office/powerpoint/2010/main" val="1215349850"/>
+        <p14:creationId xmlns:p14="http://schemas.microsoft.com/office/powerpoint/2010/main" val="2022414725"/>
       </p:ext>
     </p:extLst>
   </p:cSld>
@@ -4344,38 +4424,15 @@
           <a:p>
             <a:r>
               <a:rPr lang="en-US" dirty="0" smtClean="0"/>
-              <a:t>Ontology</a:t>
+              <a:t>Interaction Protocol</a:t>
             </a:r>
             <a:endParaRPr lang="ru-RU" dirty="0"/>
-          </a:p>
-        </p:txBody>
-      </p:sp>
-      <p:sp>
-        <p:nvSpPr>
-          <p:cNvPr id="4" name="Номер слайда 3"/>
-          <p:cNvSpPr>
-            <a:spLocks noGrp="1"/>
-          </p:cNvSpPr>
-          <p:nvPr>
-            <p:ph type="sldNum" sz="quarter" idx="12"/>
-          </p:nvPr>
-        </p:nvSpPr>
-        <p:spPr/>
-        <p:txBody>
-          <a:bodyPr/>
-          <a:lstStyle/>
-          <a:p>
-            <a:fld id="{4AD73BAB-CB55-4437-A9BC-DEADF4FBD81E}" type="slidenum">
-              <a:rPr lang="ru-RU" smtClean="0"/>
-              <a:t>16</a:t>
-            </a:fld>
-            <a:endParaRPr lang="ru-RU"/>
           </a:p>
         </p:txBody>
       </p:sp>
       <p:pic>
         <p:nvPicPr>
-          <p:cNvPr id="9" name="Объект 8"/>
+          <p:cNvPr id="7" name="Объект 6"/>
           <p:cNvPicPr>
             <a:picLocks noGrp="1" noChangeAspect="1"/>
           </p:cNvPicPr>
@@ -4397,21 +4454,44 @@
         </p:blipFill>
         <p:spPr>
           <a:xfrm>
-            <a:off x="1029122" y="2004471"/>
-            <a:ext cx="6761905" cy="4038095"/>
+            <a:off x="838200" y="1404453"/>
+            <a:ext cx="3619500" cy="4951897"/>
           </a:xfrm>
         </p:spPr>
       </p:pic>
       <p:sp>
         <p:nvSpPr>
-          <p:cNvPr id="10" name="TextBox 9"/>
+          <p:cNvPr id="4" name="Номер слайда 3"/>
+          <p:cNvSpPr>
+            <a:spLocks noGrp="1"/>
+          </p:cNvSpPr>
+          <p:nvPr>
+            <p:ph type="sldNum" sz="quarter" idx="12"/>
+          </p:nvPr>
+        </p:nvSpPr>
+        <p:spPr/>
+        <p:txBody>
+          <a:bodyPr/>
+          <a:lstStyle/>
+          <a:p>
+            <a:fld id="{4AD73BAB-CB55-4437-A9BC-DEADF4FBD81E}" type="slidenum">
+              <a:rPr lang="ru-RU" smtClean="0"/>
+              <a:t>16</a:t>
+            </a:fld>
+            <a:endParaRPr lang="ru-RU"/>
+          </a:p>
+        </p:txBody>
+      </p:sp>
+      <p:sp>
+        <p:nvSpPr>
+          <p:cNvPr id="8" name="TextBox 7"/>
           <p:cNvSpPr txBox="1"/>
           <p:nvPr/>
         </p:nvSpPr>
         <p:spPr>
           <a:xfrm>
-            <a:off x="8134350" y="1504950"/>
-            <a:ext cx="3810000" cy="3693319"/>
+            <a:off x="5753100" y="1933575"/>
+            <a:ext cx="5743575" cy="646331"/>
           </a:xfrm>
           <a:prstGeom prst="rect">
             <a:avLst/>
@@ -4425,59 +4505,47 @@
           <a:lstStyle/>
           <a:p>
             <a:r>
+              <a:rPr lang="en-US" dirty="0" smtClean="0"/>
+              <a:t>Replace manual communicative act states handling with FIPA-Contract-Net-Protocol</a:t>
+            </a:r>
+            <a:endParaRPr lang="ru-RU" dirty="0"/>
+          </a:p>
+        </p:txBody>
+      </p:sp>
+      <p:sp>
+        <p:nvSpPr>
+          <p:cNvPr id="10" name="TextBox 9"/>
+          <p:cNvSpPr txBox="1"/>
+          <p:nvPr/>
+        </p:nvSpPr>
+        <p:spPr>
+          <a:xfrm>
+            <a:off x="5753100" y="2905125"/>
+            <a:ext cx="4804007" cy="369332"/>
+          </a:xfrm>
+          <a:prstGeom prst="rect">
+            <a:avLst/>
+          </a:prstGeom>
+          <a:noFill/>
+        </p:spPr>
+        <p:txBody>
+          <a:bodyPr wrap="none" rtlCol="0">
+            <a:spAutoFit/>
+          </a:bodyPr>
+          <a:lstStyle/>
+          <a:p>
+            <a:r>
               <a:rPr lang="en-US" dirty="0"/>
-              <a:t>Application-specific ontologies describe the elements that agents use to create the content of</a:t>
-            </a:r>
-          </a:p>
-          <a:p>
-            <a:r>
-              <a:rPr lang="en-US" dirty="0" smtClean="0"/>
-              <a:t>Messages</a:t>
-            </a:r>
-          </a:p>
-          <a:p>
-            <a:endParaRPr lang="en-US" dirty="0"/>
-          </a:p>
-          <a:p>
-            <a:r>
-              <a:rPr lang="en-US" dirty="0" smtClean="0"/>
-              <a:t>This allows </a:t>
-            </a:r>
-            <a:r>
-              <a:rPr lang="en-US" dirty="0"/>
-              <a:t>to create </a:t>
-            </a:r>
-            <a:r>
-              <a:rPr lang="en-US" dirty="0" smtClean="0"/>
-              <a:t>application specific ontologies </a:t>
-            </a:r>
-            <a:r>
-              <a:rPr lang="en-US" dirty="0"/>
-              <a:t>and to use them independently of the adopted content language: the code that</a:t>
-            </a:r>
-          </a:p>
-          <a:p>
-            <a:r>
-              <a:rPr lang="en-US" dirty="0"/>
-              <a:t>implements the ontology and the code that sends and receives messages do not depend on the</a:t>
-            </a:r>
-          </a:p>
-          <a:p>
-            <a:r>
-              <a:rPr lang="en-US" dirty="0"/>
-              <a:t>content language</a:t>
-            </a:r>
-            <a:r>
-              <a:rPr lang="en-US" dirty="0" smtClean="0"/>
-              <a:t>.</a:t>
-            </a:r>
+              <a:t>http://www.fipa.org/specs/fipa00029/index.html</a:t>
+            </a:r>
+            <a:endParaRPr lang="ru-RU" dirty="0"/>
           </a:p>
         </p:txBody>
       </p:sp>
     </p:spTree>
     <p:extLst>
       <p:ext uri="{BB962C8B-B14F-4D97-AF65-F5344CB8AC3E}">
-        <p14:creationId xmlns:p14="http://schemas.microsoft.com/office/powerpoint/2010/main" val="2299047149"/>
+        <p14:creationId xmlns:p14="http://schemas.microsoft.com/office/powerpoint/2010/main" val="3214541992"/>
       </p:ext>
     </p:extLst>
   </p:cSld>
@@ -4506,7 +4574,7 @@
       </p:grpSpPr>
       <p:sp>
         <p:nvSpPr>
-          <p:cNvPr id="5" name="Заголовок 4"/>
+          <p:cNvPr id="2" name="Заголовок 1"/>
           <p:cNvSpPr>
             <a:spLocks noGrp="1"/>
           </p:cNvSpPr>
@@ -4521,7 +4589,11 @@
           <a:p>
             <a:r>
               <a:rPr lang="en-US" dirty="0" smtClean="0"/>
-              <a:t>Tutorial 6</a:t>
+              <a:t>Tutorial </a:t>
+            </a:r>
+            <a:r>
+              <a:rPr lang="en-US" dirty="0" smtClean="0"/>
+              <a:t>7</a:t>
             </a:r>
             <a:endParaRPr lang="ru-RU" dirty="0"/>
           </a:p>
@@ -4529,7 +4601,7 @@
       </p:sp>
       <p:sp>
         <p:nvSpPr>
-          <p:cNvPr id="6" name="Текст 5"/>
+          <p:cNvPr id="3" name="Текст 2"/>
           <p:cNvSpPr>
             <a:spLocks noGrp="1"/>
           </p:cNvSpPr>
@@ -4544,7 +4616,7 @@
           <a:p>
             <a:r>
               <a:rPr lang="en-US" dirty="0" smtClean="0"/>
-              <a:t>JADE Platform and Containers</a:t>
+              <a:t>Ontology</a:t>
             </a:r>
             <a:endParaRPr lang="ru-RU" dirty="0"/>
           </a:p>
@@ -4576,7 +4648,7 @@
     </p:spTree>
     <p:extLst>
       <p:ext uri="{BB962C8B-B14F-4D97-AF65-F5344CB8AC3E}">
-        <p14:creationId xmlns:p14="http://schemas.microsoft.com/office/powerpoint/2010/main" val="70416198"/>
+        <p14:creationId xmlns:p14="http://schemas.microsoft.com/office/powerpoint/2010/main" val="1215349850"/>
       </p:ext>
     </p:extLst>
   </p:cSld>
@@ -4612,7 +4684,7 @@
       </p:grpSpPr>
       <p:sp>
         <p:nvSpPr>
-          <p:cNvPr id="6" name="Заголовок 5"/>
+          <p:cNvPr id="5" name="Заголовок 4"/>
           <p:cNvSpPr>
             <a:spLocks noGrp="1"/>
           </p:cNvSpPr>
@@ -4627,15 +4699,38 @@
           <a:p>
             <a:r>
               <a:rPr lang="en-US" dirty="0" smtClean="0"/>
-              <a:t>JADE Platforms and Containers</a:t>
+              <a:t>Ontology</a:t>
             </a:r>
             <a:endParaRPr lang="ru-RU" dirty="0"/>
+          </a:p>
+        </p:txBody>
+      </p:sp>
+      <p:sp>
+        <p:nvSpPr>
+          <p:cNvPr id="4" name="Номер слайда 3"/>
+          <p:cNvSpPr>
+            <a:spLocks noGrp="1"/>
+          </p:cNvSpPr>
+          <p:nvPr>
+            <p:ph type="sldNum" sz="quarter" idx="12"/>
+          </p:nvPr>
+        </p:nvSpPr>
+        <p:spPr/>
+        <p:txBody>
+          <a:bodyPr/>
+          <a:lstStyle/>
+          <a:p>
+            <a:fld id="{4AD73BAB-CB55-4437-A9BC-DEADF4FBD81E}" type="slidenum">
+              <a:rPr lang="ru-RU" smtClean="0"/>
+              <a:t>18</a:t>
+            </a:fld>
+            <a:endParaRPr lang="ru-RU"/>
           </a:p>
         </p:txBody>
       </p:sp>
       <p:pic>
         <p:nvPicPr>
-          <p:cNvPr id="5" name="Объект 4"/>
+          <p:cNvPr id="9" name="Объект 8"/>
           <p:cNvPicPr>
             <a:picLocks noGrp="1" noChangeAspect="1"/>
           </p:cNvPicPr>
@@ -4657,44 +4752,21 @@
         </p:blipFill>
         <p:spPr>
           <a:xfrm>
-            <a:off x="838200" y="1412593"/>
-            <a:ext cx="6006247" cy="5155739"/>
+            <a:off x="1029122" y="2004471"/>
+            <a:ext cx="6761905" cy="4038095"/>
           </a:xfrm>
         </p:spPr>
       </p:pic>
       <p:sp>
         <p:nvSpPr>
-          <p:cNvPr id="4" name="Номер слайда 3"/>
-          <p:cNvSpPr>
-            <a:spLocks noGrp="1"/>
-          </p:cNvSpPr>
-          <p:nvPr>
-            <p:ph type="sldNum" sz="quarter" idx="12"/>
-          </p:nvPr>
-        </p:nvSpPr>
-        <p:spPr/>
-        <p:txBody>
-          <a:bodyPr/>
-          <a:lstStyle/>
-          <a:p>
-            <a:fld id="{4AD73BAB-CB55-4437-A9BC-DEADF4FBD81E}" type="slidenum">
-              <a:rPr lang="ru-RU" smtClean="0"/>
-              <a:t>18</a:t>
-            </a:fld>
-            <a:endParaRPr lang="ru-RU"/>
-          </a:p>
-        </p:txBody>
-      </p:sp>
-      <p:sp>
-        <p:nvSpPr>
-          <p:cNvPr id="7" name="TextBox 6"/>
+          <p:cNvPr id="10" name="TextBox 9"/>
           <p:cNvSpPr txBox="1"/>
           <p:nvPr/>
         </p:nvSpPr>
         <p:spPr>
           <a:xfrm>
-            <a:off x="7479792" y="1810512"/>
-            <a:ext cx="4374157" cy="1754326"/>
+            <a:off x="8134350" y="1504950"/>
+            <a:ext cx="3810000" cy="3693319"/>
           </a:xfrm>
           <a:prstGeom prst="rect">
             <a:avLst/>
@@ -4708,25 +4780,14 @@
           <a:lstStyle/>
           <a:p>
             <a:r>
-              <a:rPr lang="en-US" dirty="0" smtClean="0"/>
-              <a:t>AMS – Agent Management System (</a:t>
-            </a:r>
-            <a:r>
               <a:rPr lang="en-US" dirty="0"/>
-              <a:t>p</a:t>
-            </a:r>
-            <a:r>
-              <a:rPr lang="en-US" dirty="0" smtClean="0"/>
-              <a:t>latform management)</a:t>
-            </a:r>
-          </a:p>
-          <a:p>
-            <a:endParaRPr lang="en-US" dirty="0" smtClean="0"/>
-          </a:p>
-          <a:p>
-            <a:r>
-              <a:rPr lang="en-US" dirty="0" smtClean="0"/>
-              <a:t>DF – Directory Facilitator (service dictionary)</a:t>
+              <a:t>Application-specific ontologies describe the elements that agents use to create the content of</a:t>
+            </a:r>
+          </a:p>
+          <a:p>
+            <a:r>
+              <a:rPr lang="en-US" dirty="0" smtClean="0"/>
+              <a:t>Messages</a:t>
             </a:r>
           </a:p>
           <a:p>
@@ -4735,106 +4796,49 @@
           <a:p>
             <a:r>
               <a:rPr lang="en-US" dirty="0" smtClean="0"/>
-              <a:t>A1-A5 – Agents</a:t>
-            </a:r>
-            <a:endParaRPr lang="en-US" dirty="0"/>
-          </a:p>
-        </p:txBody>
-      </p:sp>
-      <p:sp>
-        <p:nvSpPr>
-          <p:cNvPr id="8" name="TextBox 7"/>
-          <p:cNvSpPr txBox="1"/>
-          <p:nvPr/>
-        </p:nvSpPr>
-        <p:spPr>
-          <a:xfrm>
-            <a:off x="7598664" y="4233672"/>
-            <a:ext cx="4255285" cy="2031325"/>
-          </a:xfrm>
-          <a:prstGeom prst="rect">
-            <a:avLst/>
-          </a:prstGeom>
-          <a:noFill/>
-        </p:spPr>
-        <p:txBody>
-          <a:bodyPr wrap="square" rtlCol="0">
-            <a:spAutoFit/>
-          </a:bodyPr>
-          <a:lstStyle/>
-          <a:p>
-            <a:r>
-              <a:rPr lang="en-US" dirty="0" smtClean="0"/>
-              <a:t>There are two JADE Platforms that are connected through the network</a:t>
-            </a:r>
-          </a:p>
-          <a:p>
-            <a:endParaRPr lang="en-US" dirty="0" smtClean="0"/>
-          </a:p>
-          <a:p>
-            <a:r>
-              <a:rPr lang="en-US" dirty="0" smtClean="0"/>
-              <a:t>Platform 1 has one main container and two normal containers</a:t>
-            </a:r>
-          </a:p>
-          <a:p>
-            <a:endParaRPr lang="en-US" dirty="0"/>
-          </a:p>
-          <a:p>
-            <a:r>
-              <a:rPr lang="en-US" dirty="0" smtClean="0"/>
-              <a:t>Platform 2 has one main container</a:t>
-            </a:r>
-          </a:p>
-        </p:txBody>
-      </p:sp>
-      <p:sp>
-        <p:nvSpPr>
-          <p:cNvPr id="2" name="TextBox 1"/>
-          <p:cNvSpPr txBox="1"/>
-          <p:nvPr/>
-        </p:nvSpPr>
-        <p:spPr>
-          <a:xfrm>
-            <a:off x="5017820" y="6642556"/>
-            <a:ext cx="1556836" cy="215444"/>
-          </a:xfrm>
-          <a:prstGeom prst="rect">
-            <a:avLst/>
-          </a:prstGeom>
-          <a:noFill/>
-        </p:spPr>
-        <p:txBody>
-          <a:bodyPr wrap="none" rtlCol="0">
-            <a:spAutoFit/>
-          </a:bodyPr>
-          <a:lstStyle/>
-          <a:p>
-            <a:r>
-              <a:rPr lang="en-US" sz="800" dirty="0" smtClean="0"/>
-              <a:t>JADE Programming for beginners</a:t>
-            </a:r>
-            <a:endParaRPr lang="ru-RU" sz="800" dirty="0"/>
+              <a:t>This allows </a:t>
+            </a:r>
+            <a:r>
+              <a:rPr lang="en-US" dirty="0"/>
+              <a:t>to create </a:t>
+            </a:r>
+            <a:r>
+              <a:rPr lang="en-US" dirty="0" smtClean="0"/>
+              <a:t>application specific ontologies </a:t>
+            </a:r>
+            <a:r>
+              <a:rPr lang="en-US" dirty="0"/>
+              <a:t>and to use them independently of the adopted content language: the code that</a:t>
+            </a:r>
+          </a:p>
+          <a:p>
+            <a:r>
+              <a:rPr lang="en-US" dirty="0"/>
+              <a:t>implements the ontology and the code that sends and receives messages do not depend on the</a:t>
+            </a:r>
+          </a:p>
+          <a:p>
+            <a:r>
+              <a:rPr lang="en-US" dirty="0"/>
+              <a:t>content language</a:t>
+            </a:r>
+            <a:r>
+              <a:rPr lang="en-US" dirty="0" smtClean="0"/>
+              <a:t>.</a:t>
+            </a:r>
           </a:p>
         </p:txBody>
       </p:sp>
     </p:spTree>
     <p:extLst>
       <p:ext uri="{BB962C8B-B14F-4D97-AF65-F5344CB8AC3E}">
-        <p14:creationId xmlns:p14="http://schemas.microsoft.com/office/powerpoint/2010/main" val="2217735639"/>
+        <p14:creationId xmlns:p14="http://schemas.microsoft.com/office/powerpoint/2010/main" val="2299047149"/>
       </p:ext>
     </p:extLst>
   </p:cSld>
   <p:clrMapOvr>
     <a:masterClrMapping/>
   </p:clrMapOvr>
-  <p:timing>
-    <p:tnLst>
-      <p:par>
-        <p:cTn id="1" dur="indefinite" restart="never" nodeType="tmRoot"/>
-      </p:par>
-    </p:tnLst>
-  </p:timing>
 </p:sld>
 </file>
 
@@ -4974,12 +4978,13 @@
               <a:rPr lang="en-US" dirty="0" smtClean="0">
                 <a:hlinkClick r:id="rId5"/>
               </a:rPr>
-              <a:t>github.com/gseteamproject/Examples</a:t>
+              <a:t>github.com/gseteamproject/sandbox</a:t>
             </a:r>
             <a:r>
               <a:rPr lang="en-US" dirty="0" smtClean="0"/>
               <a:t>)</a:t>
             </a:r>
+            <a:endParaRPr lang="en-US" dirty="0" smtClean="0"/>
           </a:p>
           <a:p>
             <a:r>
@@ -5002,7 +5007,6 @@
               <a:rPr lang="en-US" dirty="0" smtClean="0"/>
               <a:t>)</a:t>
             </a:r>
-            <a:endParaRPr lang="en-US" dirty="0" smtClean="0"/>
           </a:p>
         </p:txBody>
       </p:sp>
@@ -5101,22 +5105,35 @@
         </p:nvSpPr>
         <p:spPr/>
         <p:txBody>
-          <a:bodyPr/>
-          <a:lstStyle/>
-          <a:p>
-            <a:r>
-              <a:rPr lang="en-US" dirty="0" smtClean="0"/>
-              <a:t>Starting </a:t>
-            </a:r>
-            <a:r>
-              <a:rPr lang="en-US" dirty="0" smtClean="0"/>
-              <a:t>JADE Platform</a:t>
-            </a:r>
-          </a:p>
-          <a:p>
-            <a:r>
-              <a:rPr lang="en-US" dirty="0" smtClean="0"/>
-              <a:t>Simple Agent with different Behaviors</a:t>
+          <a:bodyPr>
+            <a:normAutofit/>
+          </a:bodyPr>
+          <a:lstStyle/>
+          <a:p>
+            <a:r>
+              <a:rPr lang="en-US" dirty="0" smtClean="0"/>
+              <a:t>Starting JADE </a:t>
+            </a:r>
+            <a:r>
+              <a:rPr lang="en-US" dirty="0" smtClean="0"/>
+              <a:t>Platform</a:t>
+            </a:r>
+          </a:p>
+          <a:p>
+            <a:r>
+              <a:rPr lang="en-US" dirty="0"/>
+              <a:t>JADE Platform and Containers</a:t>
+            </a:r>
+            <a:endParaRPr lang="ru-RU" dirty="0"/>
+          </a:p>
+          <a:p>
+            <a:r>
+              <a:rPr lang="en-US" dirty="0" smtClean="0"/>
+              <a:t>Simple </a:t>
+            </a:r>
+            <a:r>
+              <a:rPr lang="en-US" dirty="0" smtClean="0"/>
+              <a:t>Agent with different Behaviors</a:t>
             </a:r>
           </a:p>
           <a:p>
@@ -5142,13 +5159,7 @@
               <a:rPr lang="en-US" dirty="0" smtClean="0"/>
               <a:t>Ontology</a:t>
             </a:r>
-          </a:p>
-          <a:p>
-            <a:r>
-              <a:rPr lang="en-US" dirty="0" smtClean="0"/>
-              <a:t>JADE Platform and Containers</a:t>
-            </a:r>
-            <a:endParaRPr lang="ru-RU" dirty="0"/>
+            <a:endParaRPr lang="en-US" dirty="0" smtClean="0"/>
           </a:p>
         </p:txBody>
       </p:sp>
@@ -5381,11 +5392,7 @@
           <a:p>
             <a:r>
               <a:rPr lang="en-US" dirty="0" smtClean="0"/>
-              <a:t>Starting </a:t>
-            </a:r>
-            <a:r>
-              <a:rPr lang="en-US" dirty="0" smtClean="0"/>
-              <a:t>JADE Platform</a:t>
+              <a:t>Starting JADE Platform</a:t>
             </a:r>
             <a:endParaRPr lang="ru-RU" dirty="0"/>
           </a:p>
@@ -5512,13 +5519,8 @@
             </a:r>
             <a:r>
               <a:rPr lang="en-US" dirty="0" smtClean="0"/>
-              <a:t>where JADE can “live” and that must be active on a given host before one or more agents can be executed on that </a:t>
-            </a:r>
-            <a:r>
-              <a:rPr lang="en-US" dirty="0" smtClean="0"/>
-              <a:t>host</a:t>
-            </a:r>
-            <a:endParaRPr lang="en-US" dirty="0" smtClean="0"/>
+              <a:t>where JADE can “live” and that must be active on a given host before one or more agents can be executed on that host</a:t>
+            </a:r>
           </a:p>
           <a:p>
             <a:r>
@@ -5535,13 +5537,8 @@
             </a:r>
             <a:r>
               <a:rPr lang="en-US" dirty="0" smtClean="0"/>
-              <a:t> that programmers have to/can use (directly or by specializing them) to develop their </a:t>
-            </a:r>
-            <a:r>
-              <a:rPr lang="en-US" dirty="0" smtClean="0"/>
-              <a:t>agents</a:t>
-            </a:r>
-            <a:endParaRPr lang="en-US" dirty="0" smtClean="0"/>
+              <a:t> that programmers have to/can use (directly or by specializing them) to develop their agents</a:t>
+            </a:r>
           </a:p>
           <a:p>
             <a:r>
@@ -5558,11 +5555,7 @@
             </a:r>
             <a:r>
               <a:rPr lang="en-US" dirty="0" smtClean="0"/>
-              <a:t> that allows administrating and monitoring the activity of running </a:t>
-            </a:r>
-            <a:r>
-              <a:rPr lang="en-US" dirty="0" smtClean="0"/>
-              <a:t>agents</a:t>
+              <a:t> that allows administrating and monitoring the activity of running agents</a:t>
             </a:r>
             <a:endParaRPr lang="ru-RU" dirty="0"/>
           </a:p>
@@ -5630,7 +5623,7 @@
       </p:grpSpPr>
       <p:sp>
         <p:nvSpPr>
-          <p:cNvPr id="7" name="Заголовок 6"/>
+          <p:cNvPr id="5" name="Заголовок 4"/>
           <p:cNvSpPr>
             <a:spLocks noGrp="1"/>
           </p:cNvSpPr>
@@ -5645,7 +5638,11 @@
           <a:p>
             <a:r>
               <a:rPr lang="en-US" dirty="0" smtClean="0"/>
-              <a:t>Tutorial 1</a:t>
+              <a:t>Tutorial </a:t>
+            </a:r>
+            <a:r>
+              <a:rPr lang="en-US" dirty="0" smtClean="0"/>
+              <a:t>1</a:t>
             </a:r>
             <a:endParaRPr lang="ru-RU" dirty="0"/>
           </a:p>
@@ -5653,7 +5650,7 @@
       </p:sp>
       <p:sp>
         <p:nvSpPr>
-          <p:cNvPr id="8" name="Текст 7"/>
+          <p:cNvPr id="6" name="Текст 5"/>
           <p:cNvSpPr>
             <a:spLocks noGrp="1"/>
           </p:cNvSpPr>
@@ -5668,7 +5665,7 @@
           <a:p>
             <a:r>
               <a:rPr lang="en-US" dirty="0" smtClean="0"/>
-              <a:t>Simple Agent with different Behaviors</a:t>
+              <a:t>JADE Platform and Containers</a:t>
             </a:r>
             <a:endParaRPr lang="ru-RU" dirty="0"/>
           </a:p>
@@ -5700,7 +5697,7 @@
     </p:spTree>
     <p:extLst>
       <p:ext uri="{BB962C8B-B14F-4D97-AF65-F5344CB8AC3E}">
-        <p14:creationId xmlns:p14="http://schemas.microsoft.com/office/powerpoint/2010/main" val="1101812499"/>
+        <p14:creationId xmlns:p14="http://schemas.microsoft.com/office/powerpoint/2010/main" val="70416198"/>
       </p:ext>
     </p:extLst>
   </p:cSld>
@@ -5736,7 +5733,7 @@
       </p:grpSpPr>
       <p:sp>
         <p:nvSpPr>
-          <p:cNvPr id="5" name="Заголовок 4"/>
+          <p:cNvPr id="6" name="Заголовок 5"/>
           <p:cNvSpPr>
             <a:spLocks noGrp="1"/>
           </p:cNvSpPr>
@@ -5751,7 +5748,7 @@
           <a:p>
             <a:r>
               <a:rPr lang="en-US" dirty="0" smtClean="0"/>
-              <a:t>JADE Agent lifecycle</a:t>
+              <a:t>JADE Platforms and Containers</a:t>
             </a:r>
             <a:endParaRPr lang="ru-RU" dirty="0"/>
           </a:p>
@@ -5759,7 +5756,7 @@
       </p:sp>
       <p:pic>
         <p:nvPicPr>
-          <p:cNvPr id="7" name="Объект 6"/>
+          <p:cNvPr id="5" name="Объект 4"/>
           <p:cNvPicPr>
             <a:picLocks noGrp="1" noChangeAspect="1"/>
           </p:cNvPicPr>
@@ -5781,8 +5778,8 @@
         </p:blipFill>
         <p:spPr>
           <a:xfrm>
-            <a:off x="748863" y="1847850"/>
-            <a:ext cx="5836524" cy="4351338"/>
+            <a:off x="838200" y="1412593"/>
+            <a:ext cx="6006247" cy="5155739"/>
           </a:xfrm>
         </p:spPr>
       </p:pic>
@@ -5811,14 +5808,14 @@
       </p:sp>
       <p:sp>
         <p:nvSpPr>
-          <p:cNvPr id="8" name="TextBox 7"/>
+          <p:cNvPr id="7" name="TextBox 6"/>
           <p:cNvSpPr txBox="1"/>
           <p:nvPr/>
         </p:nvSpPr>
         <p:spPr>
           <a:xfrm>
-            <a:off x="6943725" y="1847850"/>
-            <a:ext cx="4886325" cy="3139321"/>
+            <a:off x="7479792" y="1810512"/>
+            <a:ext cx="4374157" cy="1754326"/>
           </a:xfrm>
           <a:prstGeom prst="rect">
             <a:avLst/>
@@ -5832,18 +5829,25 @@
           <a:lstStyle/>
           <a:p>
             <a:r>
+              <a:rPr lang="en-US" dirty="0" smtClean="0"/>
+              <a:t>AMS – Agent Management System (</a:t>
+            </a:r>
+            <a:r>
               <a:rPr lang="en-US" dirty="0"/>
-              <a:t>A JADE agent can be in one of several states, according to Agent Platform Life Cycle in</a:t>
-            </a:r>
-          </a:p>
-          <a:p>
-            <a:r>
-              <a:rPr lang="en-US" dirty="0"/>
-              <a:t>FIPA </a:t>
-            </a:r>
-            <a:r>
-              <a:rPr lang="en-US" dirty="0" smtClean="0"/>
-              <a:t>specification: Initiated, Active, Suspended, Waiting, Deleted, Transit</a:t>
+              <a:t>p</a:t>
+            </a:r>
+            <a:r>
+              <a:rPr lang="en-US" dirty="0" smtClean="0"/>
+              <a:t>latform management)</a:t>
+            </a:r>
+          </a:p>
+          <a:p>
+            <a:endParaRPr lang="en-US" dirty="0" smtClean="0"/>
+          </a:p>
+          <a:p>
+            <a:r>
+              <a:rPr lang="en-US" dirty="0" smtClean="0"/>
+              <a:t>DF – Directory Facilitator (service dictionary)</a:t>
             </a:r>
           </a:p>
           <a:p>
@@ -5851,46 +5855,23 @@
           </a:p>
           <a:p>
             <a:r>
-              <a:rPr lang="en-US" dirty="0"/>
-              <a:t>The Agent class provides public methods to perform transitions between the various </a:t>
-            </a:r>
-            <a:r>
-              <a:rPr lang="en-US" dirty="0" smtClean="0"/>
-              <a:t>states</a:t>
-            </a:r>
-          </a:p>
-          <a:p>
+              <a:rPr lang="en-US" dirty="0" smtClean="0"/>
+              <a:t>A1-A5 – Agents</a:t>
+            </a:r>
             <a:endParaRPr lang="en-US" dirty="0"/>
           </a:p>
-          <a:p>
-            <a:r>
-              <a:rPr lang="en-US" dirty="0"/>
-              <a:t>Each functionality/service provided by an agent should be implemented as one or</a:t>
-            </a:r>
-          </a:p>
-          <a:p>
-            <a:r>
-              <a:rPr lang="en-US" dirty="0"/>
-              <a:t>more </a:t>
-            </a:r>
-            <a:r>
-              <a:rPr lang="en-US" dirty="0" err="1"/>
-              <a:t>behaviours</a:t>
-            </a:r>
-            <a:endParaRPr lang="en-US" dirty="0" smtClean="0"/>
-          </a:p>
-        </p:txBody>
-      </p:sp>
-      <p:sp>
-        <p:nvSpPr>
-          <p:cNvPr id="9" name="TextBox 8"/>
+        </p:txBody>
+      </p:sp>
+      <p:sp>
+        <p:nvSpPr>
+          <p:cNvPr id="8" name="TextBox 7"/>
           <p:cNvSpPr txBox="1"/>
           <p:nvPr/>
         </p:nvSpPr>
         <p:spPr>
           <a:xfrm>
-            <a:off x="5312282" y="6642556"/>
-            <a:ext cx="1273105" cy="215444"/>
+            <a:off x="7598664" y="4233672"/>
+            <a:ext cx="4255285" cy="2031325"/>
           </a:xfrm>
           <a:prstGeom prst="rect">
             <a:avLst/>
@@ -5898,6 +5879,53 @@
           <a:noFill/>
         </p:spPr>
         <p:txBody>
+          <a:bodyPr wrap="square" rtlCol="0">
+            <a:spAutoFit/>
+          </a:bodyPr>
+          <a:lstStyle/>
+          <a:p>
+            <a:r>
+              <a:rPr lang="en-US" dirty="0" smtClean="0"/>
+              <a:t>There are two JADE Platforms that are connected through the network</a:t>
+            </a:r>
+          </a:p>
+          <a:p>
+            <a:endParaRPr lang="en-US" dirty="0" smtClean="0"/>
+          </a:p>
+          <a:p>
+            <a:r>
+              <a:rPr lang="en-US" dirty="0" smtClean="0"/>
+              <a:t>Platform 1 has one main container and two normal containers</a:t>
+            </a:r>
+          </a:p>
+          <a:p>
+            <a:endParaRPr lang="en-US" dirty="0"/>
+          </a:p>
+          <a:p>
+            <a:r>
+              <a:rPr lang="en-US" dirty="0" smtClean="0"/>
+              <a:t>Platform 2 has one main container</a:t>
+            </a:r>
+          </a:p>
+        </p:txBody>
+      </p:sp>
+      <p:sp>
+        <p:nvSpPr>
+          <p:cNvPr id="2" name="TextBox 1"/>
+          <p:cNvSpPr txBox="1"/>
+          <p:nvPr/>
+        </p:nvSpPr>
+        <p:spPr>
+          <a:xfrm>
+            <a:off x="5017820" y="6642556"/>
+            <a:ext cx="1556836" cy="215444"/>
+          </a:xfrm>
+          <a:prstGeom prst="rect">
+            <a:avLst/>
+          </a:prstGeom>
+          <a:noFill/>
+        </p:spPr>
+        <p:txBody>
           <a:bodyPr wrap="none" rtlCol="0">
             <a:spAutoFit/>
           </a:bodyPr>
@@ -5905,15 +5933,7 @@
           <a:p>
             <a:r>
               <a:rPr lang="en-US" sz="800" dirty="0" smtClean="0"/>
-              <a:t>JADE Programmer’s </a:t>
-            </a:r>
-            <a:r>
-              <a:rPr lang="en-US" sz="800" dirty="0"/>
-              <a:t>G</a:t>
-            </a:r>
-            <a:r>
-              <a:rPr lang="en-US" sz="800" dirty="0" smtClean="0"/>
-              <a:t>uide</a:t>
+              <a:t>JADE Programming for beginners</a:t>
             </a:r>
             <a:endParaRPr lang="ru-RU" sz="800" dirty="0"/>
           </a:p>
@@ -5922,13 +5942,20 @@
     </p:spTree>
     <p:extLst>
       <p:ext uri="{BB962C8B-B14F-4D97-AF65-F5344CB8AC3E}">
-        <p14:creationId xmlns:p14="http://schemas.microsoft.com/office/powerpoint/2010/main" val="755799877"/>
+        <p14:creationId xmlns:p14="http://schemas.microsoft.com/office/powerpoint/2010/main" val="2217735639"/>
       </p:ext>
     </p:extLst>
   </p:cSld>
   <p:clrMapOvr>
     <a:masterClrMapping/>
   </p:clrMapOvr>
+  <p:timing>
+    <p:tnLst>
+      <p:par>
+        <p:cTn id="1" dur="indefinite" restart="never" nodeType="tmRoot"/>
+      </p:par>
+    </p:tnLst>
+  </p:timing>
 </p:sld>
 </file>
 
@@ -5951,7 +5978,7 @@
       </p:grpSpPr>
       <p:sp>
         <p:nvSpPr>
-          <p:cNvPr id="2" name="Заголовок 1"/>
+          <p:cNvPr id="7" name="Заголовок 6"/>
           <p:cNvSpPr>
             <a:spLocks noGrp="1"/>
           </p:cNvSpPr>
@@ -5966,41 +5993,39 @@
           <a:p>
             <a:r>
               <a:rPr lang="en-US" dirty="0" smtClean="0"/>
-              <a:t>JADE Behaviors</a:t>
+              <a:t>Tutorial </a:t>
+            </a:r>
+            <a:r>
+              <a:rPr lang="en-US" dirty="0" smtClean="0"/>
+              <a:t>2-3</a:t>
             </a:r>
             <a:endParaRPr lang="ru-RU" dirty="0"/>
           </a:p>
         </p:txBody>
       </p:sp>
-      <p:pic>
-        <p:nvPicPr>
-          <p:cNvPr id="5" name="Объект 4"/>
-          <p:cNvPicPr>
-            <a:picLocks noGrp="1" noChangeAspect="1"/>
-          </p:cNvPicPr>
-          <p:nvPr>
-            <p:ph idx="1"/>
-          </p:nvPr>
-        </p:nvPicPr>
-        <p:blipFill>
-          <a:blip r:embed="rId2">
-            <a:extLst>
-              <a:ext uri="{28A0092B-C50C-407E-A947-70E740481C1C}">
-                <a14:useLocalDpi xmlns:a14="http://schemas.microsoft.com/office/drawing/2010/main" val="0"/>
-              </a:ext>
-            </a:extLst>
-          </a:blip>
-          <a:stretch>
-            <a:fillRect/>
-          </a:stretch>
-        </p:blipFill>
-        <p:spPr>
-          <a:xfrm>
-            <a:off x="818604" y="1288159"/>
-            <a:ext cx="5852160" cy="5615411"/>
-          </a:xfrm>
-        </p:spPr>
-      </p:pic>
+      <p:sp>
+        <p:nvSpPr>
+          <p:cNvPr id="8" name="Текст 7"/>
+          <p:cNvSpPr>
+            <a:spLocks noGrp="1"/>
+          </p:cNvSpPr>
+          <p:nvPr>
+            <p:ph type="body" idx="1"/>
+          </p:nvPr>
+        </p:nvSpPr>
+        <p:spPr/>
+        <p:txBody>
+          <a:bodyPr/>
+          <a:lstStyle/>
+          <a:p>
+            <a:r>
+              <a:rPr lang="en-US" dirty="0" smtClean="0"/>
+              <a:t>Simple Agent with different Behaviors</a:t>
+            </a:r>
+            <a:endParaRPr lang="ru-RU" dirty="0"/>
+          </a:p>
+        </p:txBody>
+      </p:sp>
       <p:sp>
         <p:nvSpPr>
           <p:cNvPr id="4" name="Номер слайда 3"/>
@@ -6021,98 +6046,13 @@
               <a:t>8</a:t>
             </a:fld>
             <a:endParaRPr lang="ru-RU"/>
-          </a:p>
-        </p:txBody>
-      </p:sp>
-      <p:sp>
-        <p:nvSpPr>
-          <p:cNvPr id="6" name="TextBox 5"/>
-          <p:cNvSpPr txBox="1"/>
-          <p:nvPr/>
-        </p:nvSpPr>
-        <p:spPr>
-          <a:xfrm>
-            <a:off x="7104888" y="1690688"/>
-            <a:ext cx="4727448" cy="2585323"/>
-          </a:xfrm>
-          <a:prstGeom prst="rect">
-            <a:avLst/>
-          </a:prstGeom>
-          <a:noFill/>
-        </p:spPr>
-        <p:txBody>
-          <a:bodyPr wrap="square" rtlCol="0">
-            <a:spAutoFit/>
-          </a:bodyPr>
-          <a:lstStyle/>
-          <a:p>
-            <a:r>
-              <a:rPr lang="en-US" dirty="0" smtClean="0"/>
-              <a:t>Behaviors are used to implement agent activities</a:t>
-            </a:r>
-          </a:p>
-          <a:p>
-            <a:endParaRPr lang="en-US" dirty="0" smtClean="0"/>
-          </a:p>
-          <a:p>
-            <a:r>
-              <a:rPr lang="en-US" dirty="0" smtClean="0"/>
-              <a:t>Each class extending Behavior must implement the action() method, that actually defines the operations to be performed when the behavior is in execution and the done() method, that specifies whether or not a behavior has completed and have to be removed from the pool of </a:t>
-            </a:r>
-            <a:r>
-              <a:rPr lang="en-US" dirty="0" err="1" smtClean="0"/>
-              <a:t>behavious</a:t>
-            </a:r>
-            <a:r>
-              <a:rPr lang="en-US" dirty="0" smtClean="0"/>
-              <a:t> an agent is carrying out.</a:t>
-            </a:r>
-            <a:endParaRPr lang="en-US" dirty="0"/>
-          </a:p>
-        </p:txBody>
-      </p:sp>
-      <p:sp>
-        <p:nvSpPr>
-          <p:cNvPr id="7" name="TextBox 6"/>
-          <p:cNvSpPr txBox="1"/>
-          <p:nvPr/>
-        </p:nvSpPr>
-        <p:spPr>
-          <a:xfrm>
-            <a:off x="5397659" y="6642556"/>
-            <a:ext cx="1273105" cy="215444"/>
-          </a:xfrm>
-          <a:prstGeom prst="rect">
-            <a:avLst/>
-          </a:prstGeom>
-          <a:noFill/>
-        </p:spPr>
-        <p:txBody>
-          <a:bodyPr wrap="none" rtlCol="0">
-            <a:spAutoFit/>
-          </a:bodyPr>
-          <a:lstStyle/>
-          <a:p>
-            <a:r>
-              <a:rPr lang="en-US" sz="800" dirty="0" smtClean="0"/>
-              <a:t>JADE Programmer’s </a:t>
-            </a:r>
-            <a:r>
-              <a:rPr lang="en-US" sz="800" dirty="0"/>
-              <a:t>G</a:t>
-            </a:r>
-            <a:r>
-              <a:rPr lang="en-US" sz="800" dirty="0" smtClean="0"/>
-              <a:t>uide</a:t>
-            </a:r>
-            <a:endParaRPr lang="ru-RU" sz="800" dirty="0"/>
           </a:p>
         </p:txBody>
       </p:sp>
     </p:spTree>
     <p:extLst>
       <p:ext uri="{BB962C8B-B14F-4D97-AF65-F5344CB8AC3E}">
-        <p14:creationId xmlns:p14="http://schemas.microsoft.com/office/powerpoint/2010/main" val="1779358783"/>
+        <p14:creationId xmlns:p14="http://schemas.microsoft.com/office/powerpoint/2010/main" val="1101812499"/>
       </p:ext>
     </p:extLst>
   </p:cSld>
@@ -6163,34 +6103,41 @@
           <a:p>
             <a:r>
               <a:rPr lang="en-US" dirty="0" smtClean="0"/>
-              <a:t>Tutorial 2</a:t>
+              <a:t>JADE Agent lifecycle</a:t>
             </a:r>
             <a:endParaRPr lang="ru-RU" dirty="0"/>
           </a:p>
         </p:txBody>
       </p:sp>
-      <p:sp>
-        <p:nvSpPr>
-          <p:cNvPr id="6" name="Текст 5"/>
-          <p:cNvSpPr>
-            <a:spLocks noGrp="1"/>
-          </p:cNvSpPr>
-          <p:nvPr>
-            <p:ph type="body" idx="1"/>
-          </p:nvPr>
-        </p:nvSpPr>
-        <p:spPr/>
-        <p:txBody>
-          <a:bodyPr/>
-          <a:lstStyle/>
-          <a:p>
-            <a:r>
-              <a:rPr lang="en-US" dirty="0" smtClean="0"/>
-              <a:t>Receiving and sending Messages</a:t>
-            </a:r>
-          </a:p>
-        </p:txBody>
-      </p:sp>
+      <p:pic>
+        <p:nvPicPr>
+          <p:cNvPr id="7" name="Объект 6"/>
+          <p:cNvPicPr>
+            <a:picLocks noGrp="1" noChangeAspect="1"/>
+          </p:cNvPicPr>
+          <p:nvPr>
+            <p:ph idx="1"/>
+          </p:nvPr>
+        </p:nvPicPr>
+        <p:blipFill>
+          <a:blip r:embed="rId2">
+            <a:extLst>
+              <a:ext uri="{28A0092B-C50C-407E-A947-70E740481C1C}">
+                <a14:useLocalDpi xmlns:a14="http://schemas.microsoft.com/office/drawing/2010/main" val="0"/>
+              </a:ext>
+            </a:extLst>
+          </a:blip>
+          <a:stretch>
+            <a:fillRect/>
+          </a:stretch>
+        </p:blipFill>
+        <p:spPr>
+          <a:xfrm>
+            <a:off x="748863" y="1847850"/>
+            <a:ext cx="5836524" cy="4351338"/>
+          </a:xfrm>
+        </p:spPr>
+      </p:pic>
       <p:sp>
         <p:nvSpPr>
           <p:cNvPr id="4" name="Номер слайда 3"/>
@@ -6211,26 +6158,129 @@
               <a:t>9</a:t>
             </a:fld>
             <a:endParaRPr lang="ru-RU"/>
+          </a:p>
+        </p:txBody>
+      </p:sp>
+      <p:sp>
+        <p:nvSpPr>
+          <p:cNvPr id="8" name="TextBox 7"/>
+          <p:cNvSpPr txBox="1"/>
+          <p:nvPr/>
+        </p:nvSpPr>
+        <p:spPr>
+          <a:xfrm>
+            <a:off x="6943725" y="1847850"/>
+            <a:ext cx="4886325" cy="3139321"/>
+          </a:xfrm>
+          <a:prstGeom prst="rect">
+            <a:avLst/>
+          </a:prstGeom>
+          <a:noFill/>
+        </p:spPr>
+        <p:txBody>
+          <a:bodyPr wrap="square" rtlCol="0">
+            <a:spAutoFit/>
+          </a:bodyPr>
+          <a:lstStyle/>
+          <a:p>
+            <a:r>
+              <a:rPr lang="en-US" dirty="0"/>
+              <a:t>A JADE agent can be in one of several states, according to Agent Platform Life Cycle in</a:t>
+            </a:r>
+          </a:p>
+          <a:p>
+            <a:r>
+              <a:rPr lang="en-US" dirty="0"/>
+              <a:t>FIPA </a:t>
+            </a:r>
+            <a:r>
+              <a:rPr lang="en-US" dirty="0" smtClean="0"/>
+              <a:t>specification: Initiated, Active, Suspended, Waiting, Deleted, Transit</a:t>
+            </a:r>
+          </a:p>
+          <a:p>
+            <a:endParaRPr lang="en-US" dirty="0"/>
+          </a:p>
+          <a:p>
+            <a:r>
+              <a:rPr lang="en-US" dirty="0"/>
+              <a:t>The Agent class provides public methods to perform transitions between the various </a:t>
+            </a:r>
+            <a:r>
+              <a:rPr lang="en-US" dirty="0" smtClean="0"/>
+              <a:t>states</a:t>
+            </a:r>
+          </a:p>
+          <a:p>
+            <a:endParaRPr lang="en-US" dirty="0"/>
+          </a:p>
+          <a:p>
+            <a:r>
+              <a:rPr lang="en-US" dirty="0"/>
+              <a:t>Each functionality/service provided by an agent should be implemented as one or</a:t>
+            </a:r>
+          </a:p>
+          <a:p>
+            <a:r>
+              <a:rPr lang="en-US" dirty="0"/>
+              <a:t>more </a:t>
+            </a:r>
+            <a:r>
+              <a:rPr lang="en-US" dirty="0" err="1"/>
+              <a:t>behaviours</a:t>
+            </a:r>
+            <a:endParaRPr lang="en-US" dirty="0" smtClean="0"/>
+          </a:p>
+        </p:txBody>
+      </p:sp>
+      <p:sp>
+        <p:nvSpPr>
+          <p:cNvPr id="9" name="TextBox 8"/>
+          <p:cNvSpPr txBox="1"/>
+          <p:nvPr/>
+        </p:nvSpPr>
+        <p:spPr>
+          <a:xfrm>
+            <a:off x="5312282" y="6642556"/>
+            <a:ext cx="1273105" cy="215444"/>
+          </a:xfrm>
+          <a:prstGeom prst="rect">
+            <a:avLst/>
+          </a:prstGeom>
+          <a:noFill/>
+        </p:spPr>
+        <p:txBody>
+          <a:bodyPr wrap="none" rtlCol="0">
+            <a:spAutoFit/>
+          </a:bodyPr>
+          <a:lstStyle/>
+          <a:p>
+            <a:r>
+              <a:rPr lang="en-US" sz="800" dirty="0" smtClean="0"/>
+              <a:t>JADE Programmer’s </a:t>
+            </a:r>
+            <a:r>
+              <a:rPr lang="en-US" sz="800" dirty="0"/>
+              <a:t>G</a:t>
+            </a:r>
+            <a:r>
+              <a:rPr lang="en-US" sz="800" dirty="0" smtClean="0"/>
+              <a:t>uide</a:t>
+            </a:r>
+            <a:endParaRPr lang="ru-RU" sz="800" dirty="0"/>
           </a:p>
         </p:txBody>
       </p:sp>
     </p:spTree>
     <p:extLst>
       <p:ext uri="{BB962C8B-B14F-4D97-AF65-F5344CB8AC3E}">
-        <p14:creationId xmlns:p14="http://schemas.microsoft.com/office/powerpoint/2010/main" val="1868951449"/>
+        <p14:creationId xmlns:p14="http://schemas.microsoft.com/office/powerpoint/2010/main" val="755799877"/>
       </p:ext>
     </p:extLst>
   </p:cSld>
   <p:clrMapOvr>
     <a:masterClrMapping/>
   </p:clrMapOvr>
-  <p:timing>
-    <p:tnLst>
-      <p:par>
-        <p:cTn id="1" dur="indefinite" restart="never" nodeType="tmRoot"/>
-      </p:par>
-    </p:tnLst>
-  </p:timing>
 </p:sld>
 </file>
 

</xml_diff>